<commit_message>
changed pptx and pbix
</commit_message>
<xml_diff>
--- a/startup_apresentacao.pptx
+++ b/startup_apresentacao.pptx
@@ -13,15 +13,14 @@
     <p:sldId id="264" r:id="rId7"/>
     <p:sldId id="266" r:id="rId8"/>
     <p:sldId id="265" r:id="rId9"/>
-    <p:sldId id="267" r:id="rId10"/>
-    <p:sldId id="263" r:id="rId11"/>
-    <p:sldId id="269" r:id="rId12"/>
-    <p:sldId id="270" r:id="rId13"/>
-    <p:sldId id="268" r:id="rId14"/>
-    <p:sldId id="272" r:id="rId15"/>
-    <p:sldId id="273" r:id="rId16"/>
-    <p:sldId id="271" r:id="rId17"/>
-    <p:sldId id="262" r:id="rId18"/>
+    <p:sldId id="263" r:id="rId10"/>
+    <p:sldId id="269" r:id="rId11"/>
+    <p:sldId id="270" r:id="rId12"/>
+    <p:sldId id="268" r:id="rId13"/>
+    <p:sldId id="272" r:id="rId14"/>
+    <p:sldId id="273" r:id="rId15"/>
+    <p:sldId id="271" r:id="rId16"/>
+    <p:sldId id="262" r:id="rId17"/>
   </p:sldIdLst>
   <p:sldSz cx="12192000" cy="6858000"/>
   <p:notesSz cx="6858000" cy="9144000"/>
@@ -275,7 +274,7 @@
           <a:p>
             <a:fld id="{36FB41EE-9680-4A7E-B378-00EE83B7C66A}" type="datetimeFigureOut">
               <a:rPr lang="pt-BR" smtClean="0"/>
-              <a:t>15/12/2023</a:t>
+              <a:t>18/12/2023</a:t>
             </a:fld>
             <a:endParaRPr lang="pt-BR"/>
           </a:p>
@@ -473,7 +472,7 @@
           <a:p>
             <a:fld id="{36FB41EE-9680-4A7E-B378-00EE83B7C66A}" type="datetimeFigureOut">
               <a:rPr lang="pt-BR" smtClean="0"/>
-              <a:t>15/12/2023</a:t>
+              <a:t>18/12/2023</a:t>
             </a:fld>
             <a:endParaRPr lang="pt-BR"/>
           </a:p>
@@ -681,7 +680,7 @@
           <a:p>
             <a:fld id="{36FB41EE-9680-4A7E-B378-00EE83B7C66A}" type="datetimeFigureOut">
               <a:rPr lang="pt-BR" smtClean="0"/>
-              <a:t>15/12/2023</a:t>
+              <a:t>18/12/2023</a:t>
             </a:fld>
             <a:endParaRPr lang="pt-BR"/>
           </a:p>
@@ -879,7 +878,7 @@
           <a:p>
             <a:fld id="{36FB41EE-9680-4A7E-B378-00EE83B7C66A}" type="datetimeFigureOut">
               <a:rPr lang="pt-BR" smtClean="0"/>
-              <a:t>15/12/2023</a:t>
+              <a:t>18/12/2023</a:t>
             </a:fld>
             <a:endParaRPr lang="pt-BR"/>
           </a:p>
@@ -1154,7 +1153,7 @@
           <a:p>
             <a:fld id="{36FB41EE-9680-4A7E-B378-00EE83B7C66A}" type="datetimeFigureOut">
               <a:rPr lang="pt-BR" smtClean="0"/>
-              <a:t>15/12/2023</a:t>
+              <a:t>18/12/2023</a:t>
             </a:fld>
             <a:endParaRPr lang="pt-BR"/>
           </a:p>
@@ -1419,7 +1418,7 @@
           <a:p>
             <a:fld id="{36FB41EE-9680-4A7E-B378-00EE83B7C66A}" type="datetimeFigureOut">
               <a:rPr lang="pt-BR" smtClean="0"/>
-              <a:t>15/12/2023</a:t>
+              <a:t>18/12/2023</a:t>
             </a:fld>
             <a:endParaRPr lang="pt-BR"/>
           </a:p>
@@ -1831,7 +1830,7 @@
           <a:p>
             <a:fld id="{36FB41EE-9680-4A7E-B378-00EE83B7C66A}" type="datetimeFigureOut">
               <a:rPr lang="pt-BR" smtClean="0"/>
-              <a:t>15/12/2023</a:t>
+              <a:t>18/12/2023</a:t>
             </a:fld>
             <a:endParaRPr lang="pt-BR"/>
           </a:p>
@@ -1972,7 +1971,7 @@
           <a:p>
             <a:fld id="{36FB41EE-9680-4A7E-B378-00EE83B7C66A}" type="datetimeFigureOut">
               <a:rPr lang="pt-BR" smtClean="0"/>
-              <a:t>15/12/2023</a:t>
+              <a:t>18/12/2023</a:t>
             </a:fld>
             <a:endParaRPr lang="pt-BR"/>
           </a:p>
@@ -2085,7 +2084,7 @@
           <a:p>
             <a:fld id="{36FB41EE-9680-4A7E-B378-00EE83B7C66A}" type="datetimeFigureOut">
               <a:rPr lang="pt-BR" smtClean="0"/>
-              <a:t>15/12/2023</a:t>
+              <a:t>18/12/2023</a:t>
             </a:fld>
             <a:endParaRPr lang="pt-BR"/>
           </a:p>
@@ -2396,7 +2395,7 @@
           <a:p>
             <a:fld id="{36FB41EE-9680-4A7E-B378-00EE83B7C66A}" type="datetimeFigureOut">
               <a:rPr lang="pt-BR" smtClean="0"/>
-              <a:t>15/12/2023</a:t>
+              <a:t>18/12/2023</a:t>
             </a:fld>
             <a:endParaRPr lang="pt-BR"/>
           </a:p>
@@ -2684,7 +2683,7 @@
           <a:p>
             <a:fld id="{36FB41EE-9680-4A7E-B378-00EE83B7C66A}" type="datetimeFigureOut">
               <a:rPr lang="pt-BR" smtClean="0"/>
-              <a:t>15/12/2023</a:t>
+              <a:t>18/12/2023</a:t>
             </a:fld>
             <a:endParaRPr lang="pt-BR"/>
           </a:p>
@@ -2925,7 +2924,7 @@
           <a:p>
             <a:fld id="{36FB41EE-9680-4A7E-B378-00EE83B7C66A}" type="datetimeFigureOut">
               <a:rPr lang="pt-BR" smtClean="0"/>
-              <a:t>15/12/2023</a:t>
+              <a:t>18/12/2023</a:t>
             </a:fld>
             <a:endParaRPr lang="pt-BR"/>
           </a:p>
@@ -4009,8 +4008,8 @@
         </p:nvSpPr>
         <p:spPr>
           <a:xfrm>
-            <a:off x="2979038" y="62614"/>
-            <a:ext cx="6233922" cy="584775"/>
+            <a:off x="3939017" y="62614"/>
+            <a:ext cx="4313961" cy="584775"/>
           </a:xfrm>
           <a:prstGeom prst="rect">
             <a:avLst/>
@@ -4032,17 +4031,36 @@
                 <a:ea typeface="Segoe UI Historic" panose="020B0502040204020203" pitchFamily="34" charset="0"/>
                 <a:cs typeface="Segoe UI Historic" panose="020B0502040204020203" pitchFamily="34" charset="0"/>
               </a:rPr>
-              <a:t>Gráfico - Assinaturas x Abandonos</a:t>
-            </a:r>
+              <a:t>Gráfico - Taxa de </a:t>
+            </a:r>
+            <a:r>
+              <a:rPr lang="pt-BR" sz="3200" b="1" dirty="0" err="1">
+                <a:solidFill>
+                  <a:schemeClr val="bg1"/>
+                </a:solidFill>
+                <a:latin typeface="Segoe UI Historic" panose="020B0502040204020203" pitchFamily="34" charset="0"/>
+                <a:ea typeface="Segoe UI Historic" panose="020B0502040204020203" pitchFamily="34" charset="0"/>
+                <a:cs typeface="Segoe UI Historic" panose="020B0502040204020203" pitchFamily="34" charset="0"/>
+              </a:rPr>
+              <a:t>Churn</a:t>
+            </a:r>
+            <a:endParaRPr lang="pt-BR" sz="3200" b="1" dirty="0">
+              <a:solidFill>
+                <a:schemeClr val="bg1"/>
+              </a:solidFill>
+              <a:latin typeface="Segoe UI Historic" panose="020B0502040204020203" pitchFamily="34" charset="0"/>
+              <a:ea typeface="Segoe UI Historic" panose="020B0502040204020203" pitchFamily="34" charset="0"/>
+              <a:cs typeface="Segoe UI Historic" panose="020B0502040204020203" pitchFamily="34" charset="0"/>
+            </a:endParaRPr>
           </a:p>
         </p:txBody>
       </p:sp>
       <p:pic>
         <p:nvPicPr>
-          <p:cNvPr id="3" name="Imagem 2">
-            <a:extLst>
-              <a:ext uri="{FF2B5EF4-FFF2-40B4-BE49-F238E27FC236}">
-                <a16:creationId xmlns:a16="http://schemas.microsoft.com/office/drawing/2014/main" id="{6465BEFD-2C59-1D0B-BEC6-9DE380DCB9D7}"/>
+          <p:cNvPr id="5" name="Imagem 4">
+            <a:extLst>
+              <a:ext uri="{FF2B5EF4-FFF2-40B4-BE49-F238E27FC236}">
+                <a16:creationId xmlns:a16="http://schemas.microsoft.com/office/drawing/2014/main" id="{7672B7A9-2613-C11A-0A2A-72D38BED711B}"/>
               </a:ext>
             </a:extLst>
           </p:cNvPr>
@@ -4059,8 +4077,8 @@
         </p:blipFill>
         <p:spPr>
           <a:xfrm>
-            <a:off x="195262" y="1274545"/>
-            <a:ext cx="11801475" cy="5000625"/>
+            <a:off x="195259" y="1302739"/>
+            <a:ext cx="11801475" cy="4962525"/>
           </a:xfrm>
           <a:prstGeom prst="rect">
             <a:avLst/>
@@ -4070,7 +4088,7 @@
     </p:spTree>
     <p:extLst>
       <p:ext uri="{BB962C8B-B14F-4D97-AF65-F5344CB8AC3E}">
-        <p14:creationId xmlns:p14="http://schemas.microsoft.com/office/powerpoint/2010/main" val="3234367903"/>
+        <p14:creationId xmlns:p14="http://schemas.microsoft.com/office/powerpoint/2010/main" val="3003409289"/>
       </p:ext>
     </p:extLst>
   </p:cSld>
@@ -4099,10 +4117,10 @@
       </p:grpSpPr>
       <p:sp>
         <p:nvSpPr>
-          <p:cNvPr id="4" name="Retângulo 3">
-            <a:extLst>
-              <a:ext uri="{FF2B5EF4-FFF2-40B4-BE49-F238E27FC236}">
-                <a16:creationId xmlns:a16="http://schemas.microsoft.com/office/drawing/2014/main" id="{7FE072A4-EAAA-C030-7176-8D80C2499955}"/>
+          <p:cNvPr id="5" name="Retângulo 4">
+            <a:extLst>
+              <a:ext uri="{FF2B5EF4-FFF2-40B4-BE49-F238E27FC236}">
+                <a16:creationId xmlns:a16="http://schemas.microsoft.com/office/drawing/2014/main" id="{A243E152-5056-F237-AEC0-476214728575}"/>
               </a:ext>
             </a:extLst>
           </p:cNvPr>
@@ -4148,236 +4166,6 @@
           <a:lstStyle/>
           <a:p>
             <a:pPr algn="ctr"/>
-            <a:endParaRPr lang="pt-BR"/>
-          </a:p>
-        </p:txBody>
-      </p:sp>
-      <p:sp>
-        <p:nvSpPr>
-          <p:cNvPr id="26" name="Retângulo 25">
-            <a:extLst>
-              <a:ext uri="{FF2B5EF4-FFF2-40B4-BE49-F238E27FC236}">
-                <a16:creationId xmlns:a16="http://schemas.microsoft.com/office/drawing/2014/main" id="{F9AA73A7-E79E-6903-F02A-A770FF4B4CF0}"/>
-              </a:ext>
-            </a:extLst>
-          </p:cNvPr>
-          <p:cNvSpPr/>
-          <p:nvPr/>
-        </p:nvSpPr>
-        <p:spPr>
-          <a:xfrm>
-            <a:off x="0" y="0"/>
-            <a:ext cx="12192000" cy="710004"/>
-          </a:xfrm>
-          <a:prstGeom prst="rect">
-            <a:avLst/>
-          </a:prstGeom>
-          <a:solidFill>
-            <a:srgbClr val="33A799"/>
-          </a:solidFill>
-          <a:ln>
-            <a:solidFill>
-              <a:srgbClr val="33A799"/>
-            </a:solidFill>
-          </a:ln>
-        </p:spPr>
-        <p:style>
-          <a:lnRef idx="2">
-            <a:schemeClr val="accent1">
-              <a:shade val="15000"/>
-            </a:schemeClr>
-          </a:lnRef>
-          <a:fillRef idx="1">
-            <a:schemeClr val="accent1"/>
-          </a:fillRef>
-          <a:effectRef idx="0">
-            <a:schemeClr val="accent1"/>
-          </a:effectRef>
-          <a:fontRef idx="minor">
-            <a:schemeClr val="lt1"/>
-          </a:fontRef>
-        </p:style>
-        <p:txBody>
-          <a:bodyPr rtlCol="0" anchor="ctr"/>
-          <a:lstStyle/>
-          <a:p>
-            <a:pPr algn="ctr"/>
-            <a:endParaRPr lang="pt-BR" dirty="0"/>
-          </a:p>
-        </p:txBody>
-      </p:sp>
-      <p:sp>
-        <p:nvSpPr>
-          <p:cNvPr id="6" name="CaixaDeTexto 5">
-            <a:extLst>
-              <a:ext uri="{FF2B5EF4-FFF2-40B4-BE49-F238E27FC236}">
-                <a16:creationId xmlns:a16="http://schemas.microsoft.com/office/drawing/2014/main" id="{57848EF4-9951-4E05-FD89-37BADF673673}"/>
-              </a:ext>
-            </a:extLst>
-          </p:cNvPr>
-          <p:cNvSpPr txBox="1"/>
-          <p:nvPr/>
-        </p:nvSpPr>
-        <p:spPr>
-          <a:xfrm>
-            <a:off x="3939017" y="62614"/>
-            <a:ext cx="4313961" cy="584775"/>
-          </a:xfrm>
-          <a:prstGeom prst="rect">
-            <a:avLst/>
-          </a:prstGeom>
-          <a:noFill/>
-        </p:spPr>
-        <p:txBody>
-          <a:bodyPr wrap="square" rtlCol="0">
-            <a:spAutoFit/>
-          </a:bodyPr>
-          <a:lstStyle/>
-          <a:p>
-            <a:r>
-              <a:rPr lang="pt-BR" sz="3200" b="1" dirty="0">
-                <a:solidFill>
-                  <a:schemeClr val="bg1"/>
-                </a:solidFill>
-                <a:latin typeface="Segoe UI Historic" panose="020B0502040204020203" pitchFamily="34" charset="0"/>
-                <a:ea typeface="Segoe UI Historic" panose="020B0502040204020203" pitchFamily="34" charset="0"/>
-                <a:cs typeface="Segoe UI Historic" panose="020B0502040204020203" pitchFamily="34" charset="0"/>
-              </a:rPr>
-              <a:t>Gráfico - Taxa de </a:t>
-            </a:r>
-            <a:r>
-              <a:rPr lang="pt-BR" sz="3200" b="1" dirty="0" err="1">
-                <a:solidFill>
-                  <a:schemeClr val="bg1"/>
-                </a:solidFill>
-                <a:latin typeface="Segoe UI Historic" panose="020B0502040204020203" pitchFamily="34" charset="0"/>
-                <a:ea typeface="Segoe UI Historic" panose="020B0502040204020203" pitchFamily="34" charset="0"/>
-                <a:cs typeface="Segoe UI Historic" panose="020B0502040204020203" pitchFamily="34" charset="0"/>
-              </a:rPr>
-              <a:t>Churn</a:t>
-            </a:r>
-            <a:endParaRPr lang="pt-BR" sz="3200" b="1" dirty="0">
-              <a:solidFill>
-                <a:schemeClr val="bg1"/>
-              </a:solidFill>
-              <a:latin typeface="Segoe UI Historic" panose="020B0502040204020203" pitchFamily="34" charset="0"/>
-              <a:ea typeface="Segoe UI Historic" panose="020B0502040204020203" pitchFamily="34" charset="0"/>
-              <a:cs typeface="Segoe UI Historic" panose="020B0502040204020203" pitchFamily="34" charset="0"/>
-            </a:endParaRPr>
-          </a:p>
-        </p:txBody>
-      </p:sp>
-      <p:pic>
-        <p:nvPicPr>
-          <p:cNvPr id="3" name="Imagem 2">
-            <a:extLst>
-              <a:ext uri="{FF2B5EF4-FFF2-40B4-BE49-F238E27FC236}">
-                <a16:creationId xmlns:a16="http://schemas.microsoft.com/office/drawing/2014/main" id="{BA46B05D-CD8F-E6BA-2763-F3AB0F65920D}"/>
-              </a:ext>
-            </a:extLst>
-          </p:cNvPr>
-          <p:cNvPicPr>
-            <a:picLocks noChangeAspect="1"/>
-          </p:cNvPicPr>
-          <p:nvPr/>
-        </p:nvPicPr>
-        <p:blipFill>
-          <a:blip r:embed="rId2"/>
-          <a:stretch>
-            <a:fillRect/>
-          </a:stretch>
-        </p:blipFill>
-        <p:spPr>
-          <a:xfrm>
-            <a:off x="195261" y="1308354"/>
-            <a:ext cx="11801475" cy="4991100"/>
-          </a:xfrm>
-          <a:prstGeom prst="rect">
-            <a:avLst/>
-          </a:prstGeom>
-        </p:spPr>
-      </p:pic>
-    </p:spTree>
-    <p:extLst>
-      <p:ext uri="{BB962C8B-B14F-4D97-AF65-F5344CB8AC3E}">
-        <p14:creationId xmlns:p14="http://schemas.microsoft.com/office/powerpoint/2010/main" val="3003409289"/>
-      </p:ext>
-    </p:extLst>
-  </p:cSld>
-  <p:clrMapOvr>
-    <a:masterClrMapping/>
-  </p:clrMapOvr>
-</p:sld>
-</file>
-
-<file path=ppt/slides/slide12.xml><?xml version="1.0" encoding="utf-8"?>
-<p:sld xmlns:a="http://schemas.openxmlformats.org/drawingml/2006/main" xmlns:r="http://schemas.openxmlformats.org/officeDocument/2006/relationships" xmlns:p="http://schemas.openxmlformats.org/presentationml/2006/main">
-  <p:cSld>
-    <p:spTree>
-      <p:nvGrpSpPr>
-        <p:cNvPr id="1" name=""/>
-        <p:cNvGrpSpPr/>
-        <p:nvPr/>
-      </p:nvGrpSpPr>
-      <p:grpSpPr>
-        <a:xfrm>
-          <a:off x="0" y="0"/>
-          <a:ext cx="0" cy="0"/>
-          <a:chOff x="0" y="0"/>
-          <a:chExt cx="0" cy="0"/>
-        </a:xfrm>
-      </p:grpSpPr>
-      <p:sp>
-        <p:nvSpPr>
-          <p:cNvPr id="5" name="Retângulo 4">
-            <a:extLst>
-              <a:ext uri="{FF2B5EF4-FFF2-40B4-BE49-F238E27FC236}">
-                <a16:creationId xmlns:a16="http://schemas.microsoft.com/office/drawing/2014/main" id="{A243E152-5056-F237-AEC0-476214728575}"/>
-              </a:ext>
-            </a:extLst>
-          </p:cNvPr>
-          <p:cNvSpPr/>
-          <p:nvPr/>
-        </p:nvSpPr>
-        <p:spPr>
-          <a:xfrm>
-            <a:off x="0" y="0"/>
-            <a:ext cx="12192000" cy="6858000"/>
-          </a:xfrm>
-          <a:prstGeom prst="rect">
-            <a:avLst/>
-          </a:prstGeom>
-          <a:solidFill>
-            <a:srgbClr val="25786E"/>
-          </a:solidFill>
-          <a:ln>
-            <a:solidFill>
-              <a:srgbClr val="25786E"/>
-            </a:solidFill>
-          </a:ln>
-          <a:effectLst/>
-        </p:spPr>
-        <p:style>
-          <a:lnRef idx="2">
-            <a:schemeClr val="accent1">
-              <a:shade val="15000"/>
-            </a:schemeClr>
-          </a:lnRef>
-          <a:fillRef idx="1">
-            <a:schemeClr val="accent1"/>
-          </a:fillRef>
-          <a:effectRef idx="0">
-            <a:schemeClr val="accent1"/>
-          </a:effectRef>
-          <a:fontRef idx="minor">
-            <a:schemeClr val="lt1"/>
-          </a:fontRef>
-        </p:style>
-        <p:txBody>
-          <a:bodyPr rtlCol="0" anchor="ctr"/>
-          <a:lstStyle/>
-          <a:p>
-            <a:pPr algn="ctr"/>
             <a:endParaRPr lang="pt-BR" dirty="0"/>
           </a:p>
         </p:txBody>
@@ -4652,7 +4440,7 @@
 </p:sld>
 </file>
 
-<file path=ppt/slides/slide13.xml><?xml version="1.0" encoding="utf-8"?>
+<file path=ppt/slides/slide12.xml><?xml version="1.0" encoding="utf-8"?>
 <p:sld xmlns:a="http://schemas.openxmlformats.org/drawingml/2006/main" xmlns:r="http://schemas.openxmlformats.org/officeDocument/2006/relationships" xmlns:p="http://schemas.openxmlformats.org/presentationml/2006/main">
   <p:cSld>
     <p:spTree>
@@ -8079,7 +7867,7 @@
 </p:sld>
 </file>
 
-<file path=ppt/slides/slide14.xml><?xml version="1.0" encoding="utf-8"?>
+<file path=ppt/slides/slide13.xml><?xml version="1.0" encoding="utf-8"?>
 <p:sld xmlns:a="http://schemas.openxmlformats.org/drawingml/2006/main" xmlns:r="http://schemas.openxmlformats.org/officeDocument/2006/relationships" xmlns:p="http://schemas.openxmlformats.org/presentationml/2006/main">
   <p:cSld>
     <p:spTree>
@@ -8353,7 +8141,7 @@
 </p:sld>
 </file>
 
-<file path=ppt/slides/slide15.xml><?xml version="1.0" encoding="utf-8"?>
+<file path=ppt/slides/slide14.xml><?xml version="1.0" encoding="utf-8"?>
 <p:sld xmlns:a="http://schemas.openxmlformats.org/drawingml/2006/main" xmlns:r="http://schemas.openxmlformats.org/officeDocument/2006/relationships" xmlns:p="http://schemas.openxmlformats.org/presentationml/2006/main">
   <p:cSld>
     <p:spTree>
@@ -8675,7 +8463,7 @@
 </p:sld>
 </file>
 
-<file path=ppt/slides/slide16.xml><?xml version="1.0" encoding="utf-8"?>
+<file path=ppt/slides/slide15.xml><?xml version="1.0" encoding="utf-8"?>
 <p:sld xmlns:a="http://schemas.openxmlformats.org/drawingml/2006/main" xmlns:r="http://schemas.openxmlformats.org/officeDocument/2006/relationships" xmlns:p="http://schemas.openxmlformats.org/presentationml/2006/main">
   <p:cSld>
     <p:spTree>
@@ -9101,7 +8889,7 @@
 </p:sld>
 </file>
 
-<file path=ppt/slides/slide17.xml><?xml version="1.0" encoding="utf-8"?>
+<file path=ppt/slides/slide16.xml><?xml version="1.0" encoding="utf-8"?>
 <p:sld xmlns:a="http://schemas.openxmlformats.org/drawingml/2006/main" xmlns:r="http://schemas.openxmlformats.org/officeDocument/2006/relationships" xmlns:p="http://schemas.openxmlformats.org/presentationml/2006/main">
   <p:cSld>
     <p:spTree>
@@ -11774,7 +11562,7 @@
         <p:spPr>
           <a:xfrm>
             <a:off x="255616" y="1577655"/>
-            <a:ext cx="11677304" cy="4524315"/>
+            <a:ext cx="11677304" cy="5016758"/>
           </a:xfrm>
           <a:prstGeom prst="rect">
             <a:avLst/>
@@ -11901,7 +11689,7 @@
                 <a:latin typeface="Segoe UI Light" panose="020B0502040204020203" pitchFamily="34" charset="0"/>
                 <a:cs typeface="Segoe UI Light" panose="020B0502040204020203" pitchFamily="34" charset="0"/>
               </a:rPr>
-              <a:t>No período, tivemos a entrada de </a:t>
+              <a:t>No período total (24 meses), tivemos a entrada de </a:t>
             </a:r>
             <a:r>
               <a:rPr lang="pt-BR" sz="3200" b="1" dirty="0">
@@ -12226,36 +12014,6 @@
           </a:p>
         </p:txBody>
       </p:sp>
-      <p:pic>
-        <p:nvPicPr>
-          <p:cNvPr id="5" name="Imagem 4">
-            <a:extLst>
-              <a:ext uri="{FF2B5EF4-FFF2-40B4-BE49-F238E27FC236}">
-                <a16:creationId xmlns:a16="http://schemas.microsoft.com/office/drawing/2014/main" id="{9F92BC09-7E5A-3C2E-61C5-1C638BF8B209}"/>
-              </a:ext>
-            </a:extLst>
-          </p:cNvPr>
-          <p:cNvPicPr>
-            <a:picLocks noChangeAspect="1"/>
-          </p:cNvPicPr>
-          <p:nvPr/>
-        </p:nvPicPr>
-        <p:blipFill>
-          <a:blip r:embed="rId2"/>
-          <a:stretch>
-            <a:fillRect/>
-          </a:stretch>
-        </p:blipFill>
-        <p:spPr>
-          <a:xfrm>
-            <a:off x="76199" y="1724316"/>
-            <a:ext cx="12039600" cy="4686300"/>
-          </a:xfrm>
-          <a:prstGeom prst="rect">
-            <a:avLst/>
-          </a:prstGeom>
-        </p:spPr>
-      </p:pic>
       <p:sp>
         <p:nvSpPr>
           <p:cNvPr id="6" name="Retângulo 5">
@@ -12400,11 +12158,41 @@
                 <a:latin typeface="Segoe UI Light" panose="020B0502040204020203" pitchFamily="34" charset="0"/>
                 <a:cs typeface="Segoe UI Light" panose="020B0502040204020203" pitchFamily="34" charset="0"/>
               </a:rPr>
-              <a:t>Taxa de retenção média – 74%</a:t>
-            </a:r>
-          </a:p>
-        </p:txBody>
-      </p:sp>
+              <a:t>Taxa de retenção média – 59%</a:t>
+            </a:r>
+          </a:p>
+        </p:txBody>
+      </p:sp>
+      <p:pic>
+        <p:nvPicPr>
+          <p:cNvPr id="4" name="Imagem 3">
+            <a:extLst>
+              <a:ext uri="{FF2B5EF4-FFF2-40B4-BE49-F238E27FC236}">
+                <a16:creationId xmlns:a16="http://schemas.microsoft.com/office/drawing/2014/main" id="{B1BE946B-1AEE-733D-835E-E7A42351A97D}"/>
+              </a:ext>
+            </a:extLst>
+          </p:cNvPr>
+          <p:cNvPicPr>
+            <a:picLocks noChangeAspect="1"/>
+          </p:cNvPicPr>
+          <p:nvPr/>
+        </p:nvPicPr>
+        <p:blipFill>
+          <a:blip r:embed="rId2"/>
+          <a:stretch>
+            <a:fillRect/>
+          </a:stretch>
+        </p:blipFill>
+        <p:spPr>
+          <a:xfrm>
+            <a:off x="95249" y="1724315"/>
+            <a:ext cx="12001500" cy="4695825"/>
+          </a:xfrm>
+          <a:prstGeom prst="rect">
+            <a:avLst/>
+          </a:prstGeom>
+        </p:spPr>
+      </p:pic>
     </p:spTree>
     <p:extLst>
       <p:ext uri="{BB962C8B-B14F-4D97-AF65-F5344CB8AC3E}">
@@ -12490,36 +12278,6 @@
           </a:p>
         </p:txBody>
       </p:sp>
-      <p:pic>
-        <p:nvPicPr>
-          <p:cNvPr id="11" name="Imagem 10">
-            <a:extLst>
-              <a:ext uri="{FF2B5EF4-FFF2-40B4-BE49-F238E27FC236}">
-                <a16:creationId xmlns:a16="http://schemas.microsoft.com/office/drawing/2014/main" id="{EA2F4B88-0256-555B-BA59-3D437C42875C}"/>
-              </a:ext>
-            </a:extLst>
-          </p:cNvPr>
-          <p:cNvPicPr>
-            <a:picLocks noChangeAspect="1"/>
-          </p:cNvPicPr>
-          <p:nvPr/>
-        </p:nvPicPr>
-        <p:blipFill>
-          <a:blip r:embed="rId2"/>
-          <a:stretch>
-            <a:fillRect/>
-          </a:stretch>
-        </p:blipFill>
-        <p:spPr>
-          <a:xfrm>
-            <a:off x="80961" y="1719553"/>
-            <a:ext cx="12030075" cy="4695825"/>
-          </a:xfrm>
-          <a:prstGeom prst="rect">
-            <a:avLst/>
-          </a:prstGeom>
-        </p:spPr>
-      </p:pic>
       <p:sp>
         <p:nvSpPr>
           <p:cNvPr id="13" name="Retângulo 12">
@@ -12664,11 +12422,41 @@
                 <a:latin typeface="Segoe UI Light" panose="020B0502040204020203" pitchFamily="34" charset="0"/>
                 <a:cs typeface="Segoe UI Light" panose="020B0502040204020203" pitchFamily="34" charset="0"/>
               </a:rPr>
-              <a:t>Taxa de retenção média – 54,7%</a:t>
-            </a:r>
-          </a:p>
-        </p:txBody>
-      </p:sp>
+              <a:t>Taxa de retenção média – 62%</a:t>
+            </a:r>
+          </a:p>
+        </p:txBody>
+      </p:sp>
+      <p:pic>
+        <p:nvPicPr>
+          <p:cNvPr id="5" name="Imagem 4">
+            <a:extLst>
+              <a:ext uri="{FF2B5EF4-FFF2-40B4-BE49-F238E27FC236}">
+                <a16:creationId xmlns:a16="http://schemas.microsoft.com/office/drawing/2014/main" id="{EEBEE5D9-0530-AC4B-3664-C63F2F5385AC}"/>
+              </a:ext>
+            </a:extLst>
+          </p:cNvPr>
+          <p:cNvPicPr>
+            <a:picLocks noChangeAspect="1"/>
+          </p:cNvPicPr>
+          <p:nvPr/>
+        </p:nvPicPr>
+        <p:blipFill>
+          <a:blip r:embed="rId2"/>
+          <a:stretch>
+            <a:fillRect/>
+          </a:stretch>
+        </p:blipFill>
+        <p:spPr>
+          <a:xfrm>
+            <a:off x="95247" y="1719553"/>
+            <a:ext cx="12001500" cy="4705350"/>
+          </a:xfrm>
+          <a:prstGeom prst="rect">
+            <a:avLst/>
+          </a:prstGeom>
+        </p:spPr>
+      </p:pic>
     </p:spTree>
     <p:extLst>
       <p:ext uri="{BB962C8B-B14F-4D97-AF65-F5344CB8AC3E}">
@@ -12701,10 +12489,10 @@
       </p:grpSpPr>
       <p:sp>
         <p:nvSpPr>
-          <p:cNvPr id="12" name="Retângulo 11">
-            <a:extLst>
-              <a:ext uri="{FF2B5EF4-FFF2-40B4-BE49-F238E27FC236}">
-                <a16:creationId xmlns:a16="http://schemas.microsoft.com/office/drawing/2014/main" id="{13F91572-9CD9-AA00-6AD0-18F56EAC42A4}"/>
+          <p:cNvPr id="4" name="Retângulo 3">
+            <a:extLst>
+              <a:ext uri="{FF2B5EF4-FFF2-40B4-BE49-F238E27FC236}">
+                <a16:creationId xmlns:a16="http://schemas.microsoft.com/office/drawing/2014/main" id="{7FE072A4-EAAA-C030-7176-8D80C2499955}"/>
               </a:ext>
             </a:extLst>
           </p:cNvPr>
@@ -12756,10 +12544,10 @@
       </p:sp>
       <p:sp>
         <p:nvSpPr>
-          <p:cNvPr id="13" name="Retângulo 12">
-            <a:extLst>
-              <a:ext uri="{FF2B5EF4-FFF2-40B4-BE49-F238E27FC236}">
-                <a16:creationId xmlns:a16="http://schemas.microsoft.com/office/drawing/2014/main" id="{BDD83B85-53BD-1131-67A9-804FD7264B63}"/>
+          <p:cNvPr id="26" name="Retângulo 25">
+            <a:extLst>
+              <a:ext uri="{FF2B5EF4-FFF2-40B4-BE49-F238E27FC236}">
+                <a16:creationId xmlns:a16="http://schemas.microsoft.com/office/drawing/2014/main" id="{F9AA73A7-E79E-6903-F02A-A770FF4B4CF0}"/>
               </a:ext>
             </a:extLst>
           </p:cNvPr>
@@ -12810,10 +12598,10 @@
       </p:sp>
       <p:sp>
         <p:nvSpPr>
-          <p:cNvPr id="14" name="CaixaDeTexto 13">
-            <a:extLst>
-              <a:ext uri="{FF2B5EF4-FFF2-40B4-BE49-F238E27FC236}">
-                <a16:creationId xmlns:a16="http://schemas.microsoft.com/office/drawing/2014/main" id="{BC586145-24CF-FF17-0F0A-9F3CD25C0986}"/>
+          <p:cNvPr id="6" name="CaixaDeTexto 5">
+            <a:extLst>
+              <a:ext uri="{FF2B5EF4-FFF2-40B4-BE49-F238E27FC236}">
+                <a16:creationId xmlns:a16="http://schemas.microsoft.com/office/drawing/2014/main" id="{57848EF4-9951-4E05-FD89-37BADF673673}"/>
               </a:ext>
             </a:extLst>
           </p:cNvPr>
@@ -12822,8 +12610,8 @@
         </p:nvSpPr>
         <p:spPr>
           <a:xfrm>
-            <a:off x="4345407" y="62614"/>
-            <a:ext cx="3501185" cy="584775"/>
+            <a:off x="2979038" y="62614"/>
+            <a:ext cx="6233922" cy="584775"/>
           </a:xfrm>
           <a:prstGeom prst="rect">
             <a:avLst/>
@@ -12836,17 +12624,6 @@
           </a:bodyPr>
           <a:lstStyle/>
           <a:p>
-            <a:r>
-              <a:rPr lang="pt-BR" sz="3200" b="1" dirty="0" err="1">
-                <a:solidFill>
-                  <a:schemeClr val="bg1"/>
-                </a:solidFill>
-                <a:latin typeface="Segoe UI Historic" panose="020B0502040204020203" pitchFamily="34" charset="0"/>
-                <a:ea typeface="Segoe UI Historic" panose="020B0502040204020203" pitchFamily="34" charset="0"/>
-                <a:cs typeface="Segoe UI Historic" panose="020B0502040204020203" pitchFamily="34" charset="0"/>
-              </a:rPr>
-              <a:t>Cohort</a:t>
-            </a:r>
             <a:r>
               <a:rPr lang="pt-BR" sz="3200" b="1" dirty="0">
                 <a:solidFill>
@@ -12856,7 +12633,7 @@
                 <a:ea typeface="Segoe UI Historic" panose="020B0502040204020203" pitchFamily="34" charset="0"/>
                 <a:cs typeface="Segoe UI Historic" panose="020B0502040204020203" pitchFamily="34" charset="0"/>
               </a:rPr>
-              <a:t> – 24 meses</a:t>
+              <a:t>Gráfico - Assinaturas x Abandonos</a:t>
             </a:r>
           </a:p>
         </p:txBody>
@@ -12866,7 +12643,7 @@
           <p:cNvPr id="3" name="Imagem 2">
             <a:extLst>
               <a:ext uri="{FF2B5EF4-FFF2-40B4-BE49-F238E27FC236}">
-                <a16:creationId xmlns:a16="http://schemas.microsoft.com/office/drawing/2014/main" id="{69F20712-BD54-7D73-79EC-B508D7003B18}"/>
+                <a16:creationId xmlns:a16="http://schemas.microsoft.com/office/drawing/2014/main" id="{6465BEFD-2C59-1D0B-BEC6-9DE380DCB9D7}"/>
               </a:ext>
             </a:extLst>
           </p:cNvPr>
@@ -12883,60 +12660,18 @@
         </p:blipFill>
         <p:spPr>
           <a:xfrm>
-            <a:off x="95249" y="1714791"/>
-            <a:ext cx="12001500" cy="4705350"/>
+            <a:off x="195262" y="1274545"/>
+            <a:ext cx="11801475" cy="5000625"/>
           </a:xfrm>
           <a:prstGeom prst="rect">
             <a:avLst/>
           </a:prstGeom>
         </p:spPr>
       </p:pic>
-      <p:sp>
-        <p:nvSpPr>
-          <p:cNvPr id="4" name="CaixaDeTexto 3">
-            <a:extLst>
-              <a:ext uri="{FF2B5EF4-FFF2-40B4-BE49-F238E27FC236}">
-                <a16:creationId xmlns:a16="http://schemas.microsoft.com/office/drawing/2014/main" id="{2D62EF6D-90C6-979B-A5DD-5AE6DFAF6C28}"/>
-              </a:ext>
-            </a:extLst>
-          </p:cNvPr>
-          <p:cNvSpPr txBox="1"/>
-          <p:nvPr/>
-        </p:nvSpPr>
-        <p:spPr>
-          <a:xfrm>
-            <a:off x="3803901" y="983946"/>
-            <a:ext cx="4584193" cy="461665"/>
-          </a:xfrm>
-          <a:prstGeom prst="rect">
-            <a:avLst/>
-          </a:prstGeom>
-          <a:noFill/>
-        </p:spPr>
-        <p:txBody>
-          <a:bodyPr wrap="square" rtlCol="0">
-            <a:spAutoFit/>
-          </a:bodyPr>
-          <a:lstStyle/>
-          <a:p>
-            <a:pPr algn="ctr"/>
-            <a:r>
-              <a:rPr lang="pt-BR" sz="2400" dirty="0">
-                <a:solidFill>
-                  <a:schemeClr val="bg1"/>
-                </a:solidFill>
-                <a:latin typeface="Segoe UI Light" panose="020B0502040204020203" pitchFamily="34" charset="0"/>
-                <a:cs typeface="Segoe UI Light" panose="020B0502040204020203" pitchFamily="34" charset="0"/>
-              </a:rPr>
-              <a:t>Taxa de retenção média – 64%</a:t>
-            </a:r>
-          </a:p>
-        </p:txBody>
-      </p:sp>
     </p:spTree>
     <p:extLst>
       <p:ext uri="{BB962C8B-B14F-4D97-AF65-F5344CB8AC3E}">
-        <p14:creationId xmlns:p14="http://schemas.microsoft.com/office/powerpoint/2010/main" val="553218570"/>
+        <p14:creationId xmlns:p14="http://schemas.microsoft.com/office/powerpoint/2010/main" val="3234367903"/>
       </p:ext>
     </p:extLst>
   </p:cSld>

</xml_diff>